<commit_message>
updated notebook and powerpoint
</commit_message>
<xml_diff>
--- a/GA_Final_presentation.pptx
+++ b/GA_Final_presentation.pptx
@@ -14492,14 +14492,43 @@
       </p:sp>
       <p:pic>
         <p:nvPicPr>
-          <p:cNvPr id="6" name="Picture 5"/>
+          <p:cNvPr id="4" name="Picture 3"/>
+          <p:cNvPicPr>
+            <a:picLocks noChangeAspect="1"/>
+          </p:cNvPicPr>
+          <p:nvPr/>
+        </p:nvPicPr>
+        <p:blipFill rotWithShape="1">
+          <a:blip r:embed="rId3">
+            <a:extLst>
+              <a:ext uri="{28A0092B-C50C-407E-A947-70E740481C1C}">
+                <a14:useLocalDpi xmlns:a14="http://schemas.microsoft.com/office/drawing/2010/main" val="0"/>
+              </a:ext>
+            </a:extLst>
+          </a:blip>
+          <a:srcRect l="79354"/>
+          <a:stretch/>
+        </p:blipFill>
+        <p:spPr>
+          <a:xfrm>
+            <a:off x="8016949" y="1786269"/>
+            <a:ext cx="1051442" cy="3200400"/>
+          </a:xfrm>
+          <a:prstGeom prst="rect">
+            <a:avLst/>
+          </a:prstGeom>
+        </p:spPr>
+      </p:pic>
+      <p:pic>
+        <p:nvPicPr>
+          <p:cNvPr id="5" name="Picture 4"/>
           <p:cNvPicPr>
             <a:picLocks noChangeAspect="1"/>
           </p:cNvPicPr>
           <p:nvPr/>
         </p:nvPicPr>
         <p:blipFill>
-          <a:blip r:embed="rId3">
+          <a:blip r:embed="rId4">
             <a:extLst>
               <a:ext uri="{28A0092B-C50C-407E-A947-70E740481C1C}">
                 <a14:useLocalDpi xmlns:a14="http://schemas.microsoft.com/office/drawing/2010/main" val="0"/>
@@ -14512,48 +14541,14 @@
         </p:blipFill>
         <p:spPr>
           <a:xfrm>
-            <a:off x="3619500" y="1714500"/>
-            <a:ext cx="4940300" cy="3416300"/>
+            <a:off x="374958" y="1329956"/>
+            <a:ext cx="7641991" cy="4517951"/>
           </a:xfrm>
           <a:prstGeom prst="rect">
             <a:avLst/>
           </a:prstGeom>
         </p:spPr>
       </p:pic>
-      <p:sp>
-        <p:nvSpPr>
-          <p:cNvPr id="7" name="TextBox 6"/>
-          <p:cNvSpPr txBox="1"/>
-          <p:nvPr/>
-        </p:nvSpPr>
-        <p:spPr>
-          <a:xfrm>
-            <a:off x="5228258" y="5236170"/>
-            <a:ext cx="1722783" cy="923330"/>
-          </a:xfrm>
-          <a:prstGeom prst="rect">
-            <a:avLst/>
-          </a:prstGeom>
-          <a:noFill/>
-        </p:spPr>
-        <p:txBody>
-          <a:bodyPr wrap="square" rtlCol="0">
-            <a:spAutoFit/>
-          </a:bodyPr>
-          <a:lstStyle/>
-          <a:p>
-            <a:r>
-              <a:rPr lang="en-US" dirty="0" smtClean="0"/>
-              <a:t>Insert fancier version of </a:t>
-            </a:r>
-            <a:r>
-              <a:rPr lang="en-US" smtClean="0"/>
-              <a:t>this graph</a:t>
-            </a:r>
-            <a:endParaRPr lang="en-US"/>
-          </a:p>
-        </p:txBody>
-      </p:sp>
     </p:spTree>
     <p:extLst>
       <p:ext uri="{BB962C8B-B14F-4D97-AF65-F5344CB8AC3E}">

</xml_diff>